<commit_message>
[up] start constructing final project
</commit_message>
<xml_diff>
--- a/FinalProject/ProjectPreview_AnimalFoodChainBasedParticleSwarmOptimization.pptx
+++ b/FinalProject/ProjectPreview_AnimalFoodChainBasedParticleSwarmOptimization.pptx
@@ -113,6 +113,11 @@
       </a:defRPr>
     </a:lvl9pPr>
   </p:defaultTextStyle>
+  <p:extLst>
+    <p:ext uri="{EFAFB233-063F-42B5-8137-9DF3F51BA10A}">
+      <p15:sldGuideLst xmlns:p15="http://schemas.microsoft.com/office/powerpoint/2012/main"/>
+    </p:ext>
+  </p:extLst>
 </p:presentation>
 </file>
 
@@ -137,7 +142,7 @@
           <a:lstStyle/>
           <a:p>
             <a:pPr>
-              <a:defRPr sz="2400" b="1" i="0" u="none" strike="noStrike" kern="1200" spc="0" baseline="0">
+              <a:defRPr sz="1800" b="1" i="0" u="none" strike="noStrike" kern="1200" spc="0" baseline="0">
                 <a:solidFill>
                   <a:sysClr val="windowText" lastClr="000000"/>
                 </a:solidFill>
@@ -147,7 +152,7 @@
               </a:defRPr>
             </a:pPr>
             <a:r>
-              <a:rPr lang="en-US" sz="2400" b="1">
+              <a:rPr lang="en-US" sz="1800" b="1">
                 <a:solidFill>
                   <a:sysClr val="windowText" lastClr="000000"/>
                 </a:solidFill>
@@ -155,14 +160,14 @@
               <a:t>Working</a:t>
             </a:r>
             <a:r>
-              <a:rPr lang="en-US" sz="2400" b="1" baseline="0">
+              <a:rPr lang="en-US" sz="1800" b="1" baseline="0">
                 <a:solidFill>
                   <a:sysClr val="windowText" lastClr="000000"/>
                 </a:solidFill>
               </a:rPr>
               <a:t> Schedule</a:t>
             </a:r>
-            <a:endParaRPr lang="en-US" sz="2400" b="1">
+            <a:endParaRPr lang="en-US" sz="1800" b="1">
               <a:solidFill>
                 <a:sysClr val="windowText" lastClr="000000"/>
               </a:solidFill>
@@ -183,7 +188,7 @@
         <a:lstStyle/>
         <a:p>
           <a:pPr>
-            <a:defRPr sz="2400" b="1" i="0" u="none" strike="noStrike" kern="1200" spc="0" baseline="0">
+            <a:defRPr sz="1800" b="1" i="0" u="none" strike="noStrike" kern="1200" spc="0" baseline="0">
               <a:solidFill>
                 <a:sysClr val="windowText" lastClr="000000"/>
               </a:solidFill>
@@ -295,26 +300,26 @@
                 <c:formatCode>m/d/yyyy</c:formatCode>
                 <c:ptCount val="5"/>
                 <c:pt idx="0">
-                  <c:v>43835</c:v>
+                  <c:v>44201</c:v>
                 </c:pt>
                 <c:pt idx="1">
-                  <c:v>43835</c:v>
+                  <c:v>44201</c:v>
                 </c:pt>
                 <c:pt idx="2">
-                  <c:v>43839</c:v>
+                  <c:v>44205</c:v>
                 </c:pt>
                 <c:pt idx="3">
-                  <c:v>43844</c:v>
+                  <c:v>44210</c:v>
                 </c:pt>
                 <c:pt idx="4">
-                  <c:v>43845</c:v>
+                  <c:v>44211</c:v>
                 </c:pt>
               </c:numCache>
             </c:numRef>
           </c:val>
           <c:extLst>
             <c:ext xmlns:c16="http://schemas.microsoft.com/office/drawing/2014/chart" uri="{C3380CC4-5D6E-409C-BE32-E72D297353CC}">
-              <c16:uniqueId val="{00000000-4610-4844-B072-7C2A6BE580C0}"/>
+              <c16:uniqueId val="{00000000-EFB1-44A7-85F0-5EBD862056C2}"/>
             </c:ext>
           </c:extLst>
         </c:ser>
@@ -394,7 +399,7 @@
           </c:val>
           <c:extLst>
             <c:ext xmlns:c16="http://schemas.microsoft.com/office/drawing/2014/chart" uri="{C3380CC4-5D6E-409C-BE32-E72D297353CC}">
-              <c16:uniqueId val="{00000001-4610-4844-B072-7C2A6BE580C0}"/>
+              <c16:uniqueId val="{00000001-EFB1-44A7-85F0-5EBD862056C2}"/>
             </c:ext>
           </c:extLst>
         </c:ser>
@@ -435,7 +440,7 @@
           <a:lstStyle/>
           <a:p>
             <a:pPr>
-              <a:defRPr sz="1600" b="1" i="0" u="none" strike="noStrike" kern="1200" baseline="0">
+              <a:defRPr sz="1400" b="1" i="0" u="none" strike="noStrike" kern="1200" baseline="0">
                 <a:solidFill>
                   <a:sysClr val="windowText" lastClr="000000"/>
                 </a:solidFill>
@@ -458,7 +463,7 @@
         <c:axId val="427418479"/>
         <c:scaling>
           <c:orientation val="minMax"/>
-          <c:min val="43835"/>
+          <c:min val="44200"/>
         </c:scaling>
         <c:delete val="0"/>
         <c:axPos val="b"/>
@@ -492,7 +497,7 @@
           <a:lstStyle/>
           <a:p>
             <a:pPr>
-              <a:defRPr sz="1200" b="1" i="0" u="none" strike="noStrike" kern="1200" baseline="0">
+              <a:defRPr sz="1600" b="1" i="0" u="none" strike="noStrike" kern="1200" baseline="0">
                 <a:solidFill>
                   <a:sysClr val="windowText" lastClr="000000"/>
                 </a:solidFill>
@@ -9345,7 +9350,7 @@
             <a:fld id="{5586B75A-687E-405C-8A0B-8D00578BA2C3}" type="datetimeFigureOut">
               <a:rPr lang="en-US" smtClean="0"/>
               <a:pPr/>
-              <a:t>12/29/2020</a:t>
+              <a:t>1/4/2021</a:t>
             </a:fld>
             <a:endParaRPr lang="en-US" dirty="0"/>
           </a:p>
@@ -9517,7 +9522,7 @@
             <a:fld id="{5586B75A-687E-405C-8A0B-8D00578BA2C3}" type="datetimeFigureOut">
               <a:rPr lang="en-US" smtClean="0"/>
               <a:pPr/>
-              <a:t>12/29/2020</a:t>
+              <a:t>1/4/2021</a:t>
             </a:fld>
             <a:endParaRPr lang="en-US" dirty="0"/>
           </a:p>
@@ -9699,7 +9704,7 @@
             <a:fld id="{5586B75A-687E-405C-8A0B-8D00578BA2C3}" type="datetimeFigureOut">
               <a:rPr lang="en-US" smtClean="0"/>
               <a:pPr/>
-              <a:t>12/29/2020</a:t>
+              <a:t>1/4/2021</a:t>
             </a:fld>
             <a:endParaRPr lang="en-US" dirty="0"/>
           </a:p>
@@ -9871,7 +9876,7 @@
             <a:fld id="{5586B75A-687E-405C-8A0B-8D00578BA2C3}" type="datetimeFigureOut">
               <a:rPr lang="en-US" smtClean="0"/>
               <a:pPr/>
-              <a:t>12/29/2020</a:t>
+              <a:t>1/4/2021</a:t>
             </a:fld>
             <a:endParaRPr lang="en-US" dirty="0"/>
           </a:p>
@@ -10131,7 +10136,7 @@
             <a:fld id="{5586B75A-687E-405C-8A0B-8D00578BA2C3}" type="datetimeFigureOut">
               <a:rPr lang="en-US" smtClean="0"/>
               <a:pPr/>
-              <a:t>12/29/2020</a:t>
+              <a:t>1/4/2021</a:t>
             </a:fld>
             <a:endParaRPr lang="en-US" dirty="0"/>
           </a:p>
@@ -10421,7 +10426,7 @@
             <a:fld id="{5586B75A-687E-405C-8A0B-8D00578BA2C3}" type="datetimeFigureOut">
               <a:rPr lang="en-US" smtClean="0"/>
               <a:pPr/>
-              <a:t>12/29/2020</a:t>
+              <a:t>1/4/2021</a:t>
             </a:fld>
             <a:endParaRPr lang="en-US" dirty="0"/>
           </a:p>
@@ -10865,7 +10870,7 @@
             <a:fld id="{5586B75A-687E-405C-8A0B-8D00578BA2C3}" type="datetimeFigureOut">
               <a:rPr lang="en-US" smtClean="0"/>
               <a:pPr/>
-              <a:t>12/29/2020</a:t>
+              <a:t>1/4/2021</a:t>
             </a:fld>
             <a:endParaRPr lang="en-US" dirty="0"/>
           </a:p>
@@ -10985,7 +10990,7 @@
             <a:fld id="{5586B75A-687E-405C-8A0B-8D00578BA2C3}" type="datetimeFigureOut">
               <a:rPr lang="en-US" smtClean="0"/>
               <a:pPr/>
-              <a:t>12/29/2020</a:t>
+              <a:t>1/4/2021</a:t>
             </a:fld>
             <a:endParaRPr lang="en-US" dirty="0"/>
           </a:p>
@@ -11082,7 +11087,7 @@
             <a:fld id="{5586B75A-687E-405C-8A0B-8D00578BA2C3}" type="datetimeFigureOut">
               <a:rPr lang="en-US" smtClean="0"/>
               <a:pPr/>
-              <a:t>12/29/2020</a:t>
+              <a:t>1/4/2021</a:t>
             </a:fld>
             <a:endParaRPr lang="en-US" dirty="0"/>
           </a:p>
@@ -11372,7 +11377,7 @@
             <a:fld id="{5586B75A-687E-405C-8A0B-8D00578BA2C3}" type="datetimeFigureOut">
               <a:rPr lang="en-US" smtClean="0"/>
               <a:pPr/>
-              <a:t>12/29/2020</a:t>
+              <a:t>1/4/2021</a:t>
             </a:fld>
             <a:endParaRPr lang="en-US" dirty="0"/>
           </a:p>
@@ -11647,7 +11652,7 @@
             <a:fld id="{5586B75A-687E-405C-8A0B-8D00578BA2C3}" type="datetimeFigureOut">
               <a:rPr lang="en-US" smtClean="0"/>
               <a:pPr/>
-              <a:t>12/29/2020</a:t>
+              <a:t>1/4/2021</a:t>
             </a:fld>
             <a:endParaRPr lang="en-US" dirty="0"/>
           </a:p>
@@ -11946,7 +11951,7 @@
             <a:fld id="{5586B75A-687E-405C-8A0B-8D00578BA2C3}" type="datetimeFigureOut">
               <a:rPr lang="en-US" smtClean="0"/>
               <a:pPr/>
-              <a:t>12/29/2020</a:t>
+              <a:t>1/4/2021</a:t>
             </a:fld>
             <a:endParaRPr lang="en-US" dirty="0"/>
           </a:p>
@@ -14433,7 +14438,7 @@
       </p:sp>
       <p:graphicFrame>
         <p:nvGraphicFramePr>
-          <p:cNvPr id="10" name="Chart 9">
+          <p:cNvPr id="5" name="Chart 4">
             <a:extLst>
               <a:ext uri="{FF2B5EF4-FFF2-40B4-BE49-F238E27FC236}">
                 <a16:creationId xmlns:a16="http://schemas.microsoft.com/office/drawing/2014/main" id="{DF76766F-860B-4742-B7BD-84C97BAA5A4A}"/>
@@ -14446,14 +14451,14 @@
           <p:nvPr>
             <p:extLst>
               <p:ext uri="{D42A27DB-BD31-4B8C-83A1-F6EECF244321}">
-                <p14:modId xmlns:p14="http://schemas.microsoft.com/office/powerpoint/2010/main" val="1068585549"/>
+                <p14:modId xmlns:p14="http://schemas.microsoft.com/office/powerpoint/2010/main" val="3139524122"/>
               </p:ext>
             </p:extLst>
           </p:nvPr>
         </p:nvGraphicFramePr>
         <p:xfrm>
-          <a:off x="794805" y="501650"/>
-          <a:ext cx="10602391" cy="5854700"/>
+          <a:off x="702944" y="458470"/>
+          <a:ext cx="11012043" cy="5897880"/>
         </p:xfrm>
         <a:graphic>
           <a:graphicData uri="http://schemas.openxmlformats.org/drawingml/2006/chart">

</xml_diff>